<commit_message>
folder rearrangement and new Level 1, 2, 3 examples
</commit_message>
<xml_diff>
--- a/Practical Python for Modeling.pptx
+++ b/Practical Python for Modeling.pptx
@@ -5,18 +5,21 @@
     <p:sldMasterId id="2147483705" r:id="rId1"/>
   </p:sldMasterIdLst>
   <p:notesMasterIdLst>
-    <p:notesMasterId r:id="rId11"/>
+    <p:notesMasterId r:id="rId14"/>
   </p:notesMasterIdLst>
   <p:sldIdLst>
     <p:sldId id="256" r:id="rId2"/>
     <p:sldId id="257" r:id="rId3"/>
     <p:sldId id="258" r:id="rId4"/>
-    <p:sldId id="259" r:id="rId5"/>
-    <p:sldId id="260" r:id="rId6"/>
-    <p:sldId id="261" r:id="rId7"/>
-    <p:sldId id="262" r:id="rId8"/>
-    <p:sldId id="263" r:id="rId9"/>
-    <p:sldId id="264" r:id="rId10"/>
+    <p:sldId id="267" r:id="rId5"/>
+    <p:sldId id="259" r:id="rId6"/>
+    <p:sldId id="260" r:id="rId7"/>
+    <p:sldId id="261" r:id="rId8"/>
+    <p:sldId id="262" r:id="rId9"/>
+    <p:sldId id="263" r:id="rId10"/>
+    <p:sldId id="265" r:id="rId11"/>
+    <p:sldId id="266" r:id="rId12"/>
+    <p:sldId id="264" r:id="rId13"/>
   </p:sldIdLst>
   <p:sldSz cx="12192000" cy="6858000"/>
   <p:notesSz cx="6858000" cy="9144000"/>
@@ -2910,12 +2913,8 @@
             <a:defRPr cap="all"/>
           </a:pPr>
           <a:r>
-            <a:rPr lang="en-US" sz="1400" cap="none" baseline="0" dirty="0" err="1"/>
-            <a:t>Mostmodels</a:t>
-          </a:r>
-          <a:r>
             <a:rPr lang="en-US" sz="1400" cap="none" baseline="0" dirty="0"/>
-            <a:t> don’t have an inspectable validation trail that that builds confidence in them as you work with them and seek to extend them</a:t>
+            <a:t>Most models don’t have an inspectable validation trail that that builds confidence in them as you work with them and seek to extend them</a:t>
           </a:r>
         </a:p>
       </dgm:t>
@@ -3798,12 +3797,8 @@
             <a:defRPr cap="all"/>
           </a:pPr>
           <a:r>
-            <a:rPr lang="en-US" sz="1400" kern="1200" cap="none" baseline="0" dirty="0" err="1"/>
-            <a:t>Mostmodels</a:t>
-          </a:r>
-          <a:r>
             <a:rPr lang="en-US" sz="1400" kern="1200" cap="none" baseline="0" dirty="0"/>
-            <a:t> don’t have an inspectable validation trail that that builds confidence in them as you work with them and seek to extend them</a:t>
+            <a:t>Most models don’t have an inspectable validation trail that that builds confidence in them as you work with them and seek to extend them</a:t>
           </a:r>
         </a:p>
       </dsp:txBody>
@@ -5147,7 +5142,7 @@
           <a:p>
             <a:fld id="{22572941-46D6-F946-8FD6-7B4580E23954}" type="datetimeFigureOut">
               <a:rPr lang="en-US" smtClean="0"/>
-              <a:t>4/13/23</a:t>
+              <a:t>7/11/23</a:t>
             </a:fld>
             <a:endParaRPr lang="en-US"/>
           </a:p>
@@ -5652,7 +5647,7 @@
           <a:p>
             <a:fld id="{71908D2A-A76E-784A-B815-41F2A709CB50}" type="datetime1">
               <a:rPr lang="en-US" smtClean="0"/>
-              <a:t>4/13/23</a:t>
+              <a:t>7/11/23</a:t>
             </a:fld>
             <a:endParaRPr lang="en-US" dirty="0"/>
           </a:p>
@@ -5859,7 +5854,7 @@
           <a:p>
             <a:fld id="{1BC5DED1-DF5B-5E4A-A876-8BC778436FA8}" type="datetime1">
               <a:rPr lang="en-US" smtClean="0"/>
-              <a:t>4/13/23</a:t>
+              <a:t>7/11/23</a:t>
             </a:fld>
             <a:endParaRPr lang="en-US" dirty="0"/>
           </a:p>
@@ -6225,7 +6220,7 @@
           <a:p>
             <a:fld id="{17B57E71-48EC-FC49-A710-D9B623B18D48}" type="datetime1">
               <a:rPr lang="en-US" smtClean="0"/>
-              <a:t>4/13/23</a:t>
+              <a:t>7/11/23</a:t>
             </a:fld>
             <a:endParaRPr lang="en-US" dirty="0"/>
           </a:p>
@@ -6472,7 +6467,7 @@
           <a:p>
             <a:fld id="{48AB9FDA-55FC-124B-BA2B-0FE894EA64DE}" type="datetime1">
               <a:rPr lang="en-US" smtClean="0"/>
-              <a:t>4/13/23</a:t>
+              <a:t>7/11/23</a:t>
             </a:fld>
             <a:endParaRPr lang="en-US" dirty="0"/>
           </a:p>
@@ -6788,7 +6783,7 @@
           <a:p>
             <a:fld id="{68D18E67-C6E1-E145-81C0-167A5FAD0822}" type="datetime1">
               <a:rPr lang="en-US" smtClean="0"/>
-              <a:t>4/13/23</a:t>
+              <a:t>7/11/23</a:t>
             </a:fld>
             <a:endParaRPr lang="en-US" dirty="0"/>
           </a:p>
@@ -7045,7 +7040,7 @@
           <a:p>
             <a:fld id="{FC427479-B9FA-6748-A2F2-128CED976BCC}" type="datetime1">
               <a:rPr lang="en-US" smtClean="0"/>
-              <a:t>4/13/23</a:t>
+              <a:t>7/11/23</a:t>
             </a:fld>
             <a:endParaRPr lang="en-US" dirty="0"/>
           </a:p>
@@ -7471,7 +7466,7 @@
           <a:p>
             <a:fld id="{BB5FFED6-E919-AF41-B513-DB69A5DD0182}" type="datetime1">
               <a:rPr lang="en-US" smtClean="0"/>
-              <a:t>4/13/23</a:t>
+              <a:t>7/11/23</a:t>
             </a:fld>
             <a:endParaRPr lang="en-US" dirty="0"/>
           </a:p>
@@ -7598,7 +7593,7 @@
           <a:p>
             <a:fld id="{C46FAFCB-EECD-4447-9326-75231F9E122E}" type="datetime1">
               <a:rPr lang="en-US" smtClean="0"/>
-              <a:t>4/13/23</a:t>
+              <a:t>7/11/23</a:t>
             </a:fld>
             <a:endParaRPr lang="en-US" dirty="0"/>
           </a:p>
@@ -7697,7 +7692,7 @@
           <a:p>
             <a:fld id="{EB3B25A2-31F9-E540-AD4D-056580AF45F6}" type="datetime1">
               <a:rPr lang="en-US" smtClean="0"/>
-              <a:t>4/13/23</a:t>
+              <a:t>7/11/23</a:t>
             </a:fld>
             <a:endParaRPr lang="en-US" dirty="0"/>
           </a:p>
@@ -8078,7 +8073,7 @@
           <a:p>
             <a:fld id="{CF090BB5-4B6E-C348-A552-D21035C96951}" type="datetime1">
               <a:rPr lang="en-US" smtClean="0"/>
-              <a:t>4/13/23</a:t>
+              <a:t>7/11/23</a:t>
             </a:fld>
             <a:endParaRPr lang="en-US" dirty="0"/>
           </a:p>
@@ -8375,7 +8370,7 @@
           <a:p>
             <a:fld id="{29D9DEE7-6288-4E4F-AC7D-0F34252E699B}" type="datetime1">
               <a:rPr lang="en-US" smtClean="0"/>
-              <a:t>4/13/23</a:t>
+              <a:t>7/11/23</a:t>
             </a:fld>
             <a:endParaRPr lang="en-US" dirty="0"/>
           </a:p>
@@ -8594,7 +8589,7 @@
           <a:p>
             <a:fld id="{8A884805-2CDD-1447-9E55-D0DFA172D5AE}" type="datetime1">
               <a:rPr lang="en-US" smtClean="0"/>
-              <a:t>4/13/23</a:t>
+              <a:t>7/11/23</a:t>
             </a:fld>
             <a:endParaRPr lang="en-US" dirty="0"/>
           </a:p>
@@ -9639,6 +9634,842 @@
 </p:sld>
 </file>
 
+<file path=ppt/slides/slide10.xml><?xml version="1.0" encoding="utf-8"?>
+<p:sld xmlns:a="http://schemas.openxmlformats.org/drawingml/2006/main" xmlns:r="http://schemas.openxmlformats.org/officeDocument/2006/relationships" xmlns:p="http://schemas.openxmlformats.org/presentationml/2006/main">
+  <p:cSld>
+    <p:bg>
+      <p:bgPr>
+        <a:solidFill>
+          <a:schemeClr val="bg1"/>
+        </a:solidFill>
+        <a:effectLst/>
+      </p:bgPr>
+    </p:bg>
+    <p:spTree>
+      <p:nvGrpSpPr>
+        <p:cNvPr id="1" name=""/>
+        <p:cNvGrpSpPr/>
+        <p:nvPr/>
+      </p:nvGrpSpPr>
+      <p:grpSpPr>
+        <a:xfrm>
+          <a:off x="0" y="0"/>
+          <a:ext cx="0" cy="0"/>
+          <a:chOff x="0" y="0"/>
+          <a:chExt cx="0" cy="0"/>
+        </a:xfrm>
+      </p:grpSpPr>
+      <p:sp>
+        <p:nvSpPr>
+          <p:cNvPr id="2" name="Title 1">
+            <a:extLst>
+              <a:ext uri="{FF2B5EF4-FFF2-40B4-BE49-F238E27FC236}">
+                <a16:creationId xmlns:a16="http://schemas.microsoft.com/office/drawing/2014/main" id="{D70194DD-4843-534C-0141-FFEB710EAC32}"/>
+              </a:ext>
+            </a:extLst>
+          </p:cNvPr>
+          <p:cNvSpPr>
+            <a:spLocks noGrp="1"/>
+          </p:cNvSpPr>
+          <p:nvPr>
+            <p:ph type="title"/>
+          </p:nvPr>
+        </p:nvSpPr>
+        <p:spPr/>
+        <p:txBody>
+          <a:bodyPr anchor="ctr">
+            <a:normAutofit/>
+          </a:bodyPr>
+          <a:lstStyle/>
+          <a:p>
+            <a:r>
+              <a:rPr lang="en-US" dirty="0">
+                <a:solidFill>
+                  <a:srgbClr val="FFFFFF"/>
+                </a:solidFill>
+              </a:rPr>
+              <a:t>Coding “Styles” aka Architecture</a:t>
+            </a:r>
+          </a:p>
+        </p:txBody>
+      </p:sp>
+      <p:sp>
+        <p:nvSpPr>
+          <p:cNvPr id="3" name="Content Placeholder 2">
+            <a:extLst>
+              <a:ext uri="{FF2B5EF4-FFF2-40B4-BE49-F238E27FC236}">
+                <a16:creationId xmlns:a16="http://schemas.microsoft.com/office/drawing/2014/main" id="{79A6123A-B035-47F8-22C7-046B7F098796}"/>
+              </a:ext>
+            </a:extLst>
+          </p:cNvPr>
+          <p:cNvSpPr>
+            <a:spLocks noGrp="1"/>
+          </p:cNvSpPr>
+          <p:nvPr>
+            <p:ph idx="1"/>
+          </p:nvPr>
+        </p:nvSpPr>
+        <p:spPr/>
+        <p:txBody>
+          <a:bodyPr>
+            <a:normAutofit lnSpcReduction="10000"/>
+          </a:bodyPr>
+          <a:lstStyle/>
+          <a:p>
+            <a:pPr>
+              <a:lnSpc>
+                <a:spcPct val="90000"/>
+              </a:lnSpc>
+            </a:pPr>
+            <a:r>
+              <a:rPr lang="en-US" dirty="0"/>
+              <a:t>Level 1 – ad hoc “random walk” Jupyter notebook</a:t>
+            </a:r>
+          </a:p>
+          <a:p>
+            <a:pPr lvl="1">
+              <a:lnSpc>
+                <a:spcPct val="90000"/>
+              </a:lnSpc>
+            </a:pPr>
+            <a:r>
+              <a:rPr lang="en-US" dirty="0"/>
+              <a:t>Fast</a:t>
+            </a:r>
+          </a:p>
+          <a:p>
+            <a:pPr lvl="1">
+              <a:lnSpc>
+                <a:spcPct val="90000"/>
+              </a:lnSpc>
+            </a:pPr>
+            <a:r>
+              <a:rPr lang="en-US" dirty="0"/>
+              <a:t>Not well curated</a:t>
+            </a:r>
+          </a:p>
+          <a:p>
+            <a:pPr lvl="1">
+              <a:lnSpc>
+                <a:spcPct val="90000"/>
+              </a:lnSpc>
+            </a:pPr>
+            <a:r>
+              <a:rPr lang="en-US" dirty="0"/>
+              <a:t>Hard to validate with re-runnable checks</a:t>
+            </a:r>
+          </a:p>
+          <a:p>
+            <a:pPr lvl="1">
+              <a:lnSpc>
+                <a:spcPct val="90000"/>
+              </a:lnSpc>
+            </a:pPr>
+            <a:r>
+              <a:rPr lang="en-US" dirty="0"/>
+              <a:t>Hard to maintain/extend</a:t>
+            </a:r>
+          </a:p>
+          <a:p>
+            <a:pPr>
+              <a:lnSpc>
+                <a:spcPct val="90000"/>
+              </a:lnSpc>
+            </a:pPr>
+            <a:r>
+              <a:rPr lang="en-US" dirty="0"/>
+              <a:t>Level 2 – Procedure/function hierarchies Jupyter</a:t>
+            </a:r>
+          </a:p>
+          <a:p>
+            <a:pPr lvl="1">
+              <a:lnSpc>
+                <a:spcPct val="90000"/>
+              </a:lnSpc>
+            </a:pPr>
+            <a:r>
+              <a:rPr lang="en-US" dirty="0"/>
+              <a:t>Better curation and extensibility</a:t>
+            </a:r>
+          </a:p>
+          <a:p>
+            <a:pPr lvl="1">
+              <a:lnSpc>
+                <a:spcPct val="90000"/>
+              </a:lnSpc>
+            </a:pPr>
+            <a:r>
+              <a:rPr lang="en-US" dirty="0"/>
+              <a:t>Better for Validation but still difficult</a:t>
+            </a:r>
+          </a:p>
+          <a:p>
+            <a:pPr>
+              <a:lnSpc>
+                <a:spcPct val="90000"/>
+              </a:lnSpc>
+            </a:pPr>
+            <a:r>
+              <a:rPr lang="en-US" dirty="0"/>
+              <a:t>Level 3 – TDD/OOP aka Tuhdoop</a:t>
+            </a:r>
+          </a:p>
+          <a:p>
+            <a:pPr lvl="1">
+              <a:lnSpc>
+                <a:spcPct val="90000"/>
+              </a:lnSpc>
+            </a:pPr>
+            <a:r>
+              <a:rPr lang="en-US" dirty="0"/>
+              <a:t>Ideal for models that will be re-used</a:t>
+            </a:r>
+          </a:p>
+          <a:p>
+            <a:pPr lvl="1">
+              <a:lnSpc>
+                <a:spcPct val="90000"/>
+              </a:lnSpc>
+            </a:pPr>
+            <a:r>
+              <a:rPr lang="en-US" dirty="0"/>
+              <a:t>Re-runnable Pytest testing</a:t>
+            </a:r>
+          </a:p>
+          <a:p>
+            <a:pPr lvl="1">
+              <a:lnSpc>
+                <a:spcPct val="90000"/>
+              </a:lnSpc>
+            </a:pPr>
+            <a:r>
+              <a:rPr lang="en-US" dirty="0"/>
+              <a:t>Use Jupyter notebook as UI only; put code in *.py file</a:t>
+            </a:r>
+          </a:p>
+          <a:p>
+            <a:pPr>
+              <a:lnSpc>
+                <a:spcPct val="90000"/>
+              </a:lnSpc>
+            </a:pPr>
+            <a:endParaRPr lang="en-US" dirty="0"/>
+          </a:p>
+        </p:txBody>
+      </p:sp>
+      <p:sp>
+        <p:nvSpPr>
+          <p:cNvPr id="9" name="Footer Placeholder 8">
+            <a:extLst>
+              <a:ext uri="{FF2B5EF4-FFF2-40B4-BE49-F238E27FC236}">
+                <a16:creationId xmlns:a16="http://schemas.microsoft.com/office/drawing/2014/main" id="{5854BA57-5ECE-A8EC-EC55-4AA6505B1714}"/>
+              </a:ext>
+            </a:extLst>
+          </p:cNvPr>
+          <p:cNvSpPr>
+            <a:spLocks noGrp="1"/>
+          </p:cNvSpPr>
+          <p:nvPr>
+            <p:ph type="ftr" sz="quarter" idx="11"/>
+          </p:nvPr>
+        </p:nvSpPr>
+        <p:spPr/>
+        <p:txBody>
+          <a:bodyPr/>
+          <a:lstStyle/>
+          <a:p>
+            <a:r>
+              <a:rPr lang="en-US"/>
+              <a:t>Shared under MIT Open-Source License - Copyright 2023 Data Delve Engineer LLC</a:t>
+            </a:r>
+            <a:endParaRPr lang="en-US" dirty="0"/>
+          </a:p>
+        </p:txBody>
+      </p:sp>
+    </p:spTree>
+    <p:extLst>
+      <p:ext uri="{BB962C8B-B14F-4D97-AF65-F5344CB8AC3E}">
+        <p14:creationId xmlns:p14="http://schemas.microsoft.com/office/powerpoint/2010/main" val="3766615544"/>
+      </p:ext>
+    </p:extLst>
+  </p:cSld>
+  <p:clrMapOvr>
+    <a:masterClrMapping/>
+  </p:clrMapOvr>
+</p:sld>
+</file>
+
+<file path=ppt/slides/slide11.xml><?xml version="1.0" encoding="utf-8"?>
+<p:sld xmlns:a="http://schemas.openxmlformats.org/drawingml/2006/main" xmlns:r="http://schemas.openxmlformats.org/officeDocument/2006/relationships" xmlns:p="http://schemas.openxmlformats.org/presentationml/2006/main">
+  <p:cSld>
+    <p:bg>
+      <p:bgPr>
+        <a:solidFill>
+          <a:schemeClr val="bg1"/>
+        </a:solidFill>
+        <a:effectLst/>
+      </p:bgPr>
+    </p:bg>
+    <p:spTree>
+      <p:nvGrpSpPr>
+        <p:cNvPr id="1" name=""/>
+        <p:cNvGrpSpPr/>
+        <p:nvPr/>
+      </p:nvGrpSpPr>
+      <p:grpSpPr>
+        <a:xfrm>
+          <a:off x="0" y="0"/>
+          <a:ext cx="0" cy="0"/>
+          <a:chOff x="0" y="0"/>
+          <a:chExt cx="0" cy="0"/>
+        </a:xfrm>
+      </p:grpSpPr>
+      <p:sp>
+        <p:nvSpPr>
+          <p:cNvPr id="2" name="Title 1">
+            <a:extLst>
+              <a:ext uri="{FF2B5EF4-FFF2-40B4-BE49-F238E27FC236}">
+                <a16:creationId xmlns:a16="http://schemas.microsoft.com/office/drawing/2014/main" id="{D70194DD-4843-534C-0141-FFEB710EAC32}"/>
+              </a:ext>
+            </a:extLst>
+          </p:cNvPr>
+          <p:cNvSpPr>
+            <a:spLocks noGrp="1"/>
+          </p:cNvSpPr>
+          <p:nvPr>
+            <p:ph type="title"/>
+          </p:nvPr>
+        </p:nvSpPr>
+        <p:spPr/>
+        <p:txBody>
+          <a:bodyPr anchor="ctr">
+            <a:normAutofit/>
+          </a:bodyPr>
+          <a:lstStyle/>
+          <a:p>
+            <a:r>
+              <a:rPr lang="en-US" dirty="0">
+                <a:solidFill>
+                  <a:srgbClr val="FFFFFF"/>
+                </a:solidFill>
+              </a:rPr>
+              <a:t>Level 3 Code Arrangement</a:t>
+            </a:r>
+          </a:p>
+        </p:txBody>
+      </p:sp>
+      <p:sp>
+        <p:nvSpPr>
+          <p:cNvPr id="9" name="Footer Placeholder 8">
+            <a:extLst>
+              <a:ext uri="{FF2B5EF4-FFF2-40B4-BE49-F238E27FC236}">
+                <a16:creationId xmlns:a16="http://schemas.microsoft.com/office/drawing/2014/main" id="{5854BA57-5ECE-A8EC-EC55-4AA6505B1714}"/>
+              </a:ext>
+            </a:extLst>
+          </p:cNvPr>
+          <p:cNvSpPr>
+            <a:spLocks noGrp="1"/>
+          </p:cNvSpPr>
+          <p:nvPr>
+            <p:ph type="ftr" sz="quarter" idx="11"/>
+          </p:nvPr>
+        </p:nvSpPr>
+        <p:spPr/>
+        <p:txBody>
+          <a:bodyPr/>
+          <a:lstStyle/>
+          <a:p>
+            <a:r>
+              <a:rPr lang="en-US"/>
+              <a:t>Shared under MIT Open-Source License - Copyright 2023 Data Delve Engineer LLC</a:t>
+            </a:r>
+            <a:endParaRPr lang="en-US" dirty="0"/>
+          </a:p>
+        </p:txBody>
+      </p:sp>
+      <p:pic>
+        <p:nvPicPr>
+          <p:cNvPr id="10" name="Picture 9" descr="A diagram of a diagram&#10;&#10;Description automatically generated">
+            <a:extLst>
+              <a:ext uri="{FF2B5EF4-FFF2-40B4-BE49-F238E27FC236}">
+                <a16:creationId xmlns:a16="http://schemas.microsoft.com/office/drawing/2014/main" id="{4DF908B1-C600-1DF6-BF08-66BDD40203A9}"/>
+              </a:ext>
+            </a:extLst>
+          </p:cNvPr>
+          <p:cNvPicPr>
+            <a:picLocks noChangeAspect="1"/>
+          </p:cNvPicPr>
+          <p:nvPr/>
+        </p:nvPicPr>
+        <p:blipFill>
+          <a:blip r:embed="rId2">
+            <a:extLst>
+              <a:ext uri="{28A0092B-C50C-407E-A947-70E740481C1C}">
+                <a14:useLocalDpi xmlns:a14="http://schemas.microsoft.com/office/drawing/2010/main" val="0"/>
+              </a:ext>
+            </a:extLst>
+          </a:blip>
+          <a:stretch>
+            <a:fillRect/>
+          </a:stretch>
+        </p:blipFill>
+        <p:spPr>
+          <a:xfrm>
+            <a:off x="5838060" y="836271"/>
+            <a:ext cx="5532039" cy="3148314"/>
+          </a:xfrm>
+          <a:prstGeom prst="rect">
+            <a:avLst/>
+          </a:prstGeom>
+        </p:spPr>
+      </p:pic>
+      <p:pic>
+        <p:nvPicPr>
+          <p:cNvPr id="7" name="Content Placeholder 6" descr="A screenshot of a computer&#10;&#10;Description automatically generated">
+            <a:extLst>
+              <a:ext uri="{FF2B5EF4-FFF2-40B4-BE49-F238E27FC236}">
+                <a16:creationId xmlns:a16="http://schemas.microsoft.com/office/drawing/2014/main" id="{640E3FBA-FA73-ECD8-0EC9-82F742946AD1}"/>
+              </a:ext>
+            </a:extLst>
+          </p:cNvPr>
+          <p:cNvPicPr>
+            <a:picLocks noGrp="1" noChangeAspect="1"/>
+          </p:cNvPicPr>
+          <p:nvPr>
+            <p:ph idx="1"/>
+          </p:nvPr>
+        </p:nvPicPr>
+        <p:blipFill>
+          <a:blip r:embed="rId3">
+            <a:extLst>
+              <a:ext uri="{28A0092B-C50C-407E-A947-70E740481C1C}">
+                <a14:useLocalDpi xmlns:a14="http://schemas.microsoft.com/office/drawing/2010/main" val="0"/>
+              </a:ext>
+            </a:extLst>
+          </a:blip>
+          <a:stretch>
+            <a:fillRect/>
+          </a:stretch>
+        </p:blipFill>
+        <p:spPr>
+          <a:xfrm>
+            <a:off x="5838060" y="3304276"/>
+            <a:ext cx="5494204" cy="3148314"/>
+          </a:xfrm>
+        </p:spPr>
+      </p:pic>
+    </p:spTree>
+    <p:extLst>
+      <p:ext uri="{BB962C8B-B14F-4D97-AF65-F5344CB8AC3E}">
+        <p14:creationId xmlns:p14="http://schemas.microsoft.com/office/powerpoint/2010/main" val="3955592638"/>
+      </p:ext>
+    </p:extLst>
+  </p:cSld>
+  <p:clrMapOvr>
+    <a:masterClrMapping/>
+  </p:clrMapOvr>
+</p:sld>
+</file>
+
+<file path=ppt/slides/slide12.xml><?xml version="1.0" encoding="utf-8"?>
+<p:sld xmlns:a="http://schemas.openxmlformats.org/drawingml/2006/main" xmlns:r="http://schemas.openxmlformats.org/officeDocument/2006/relationships" xmlns:p="http://schemas.openxmlformats.org/presentationml/2006/main">
+  <p:cSld>
+    <p:spTree>
+      <p:nvGrpSpPr>
+        <p:cNvPr id="1" name=""/>
+        <p:cNvGrpSpPr/>
+        <p:nvPr/>
+      </p:nvGrpSpPr>
+      <p:grpSpPr>
+        <a:xfrm>
+          <a:off x="0" y="0"/>
+          <a:ext cx="0" cy="0"/>
+          <a:chOff x="0" y="0"/>
+          <a:chExt cx="0" cy="0"/>
+        </a:xfrm>
+      </p:grpSpPr>
+      <p:sp>
+        <p:nvSpPr>
+          <p:cNvPr id="2" name="Title 1">
+            <a:extLst>
+              <a:ext uri="{FF2B5EF4-FFF2-40B4-BE49-F238E27FC236}">
+                <a16:creationId xmlns:a16="http://schemas.microsoft.com/office/drawing/2014/main" id="{72221BA9-4A0C-DB0E-A156-182A01FB13B8}"/>
+              </a:ext>
+            </a:extLst>
+          </p:cNvPr>
+          <p:cNvSpPr>
+            <a:spLocks noGrp="1"/>
+          </p:cNvSpPr>
+          <p:nvPr>
+            <p:ph type="title"/>
+          </p:nvPr>
+        </p:nvSpPr>
+        <p:spPr/>
+        <p:txBody>
+          <a:bodyPr/>
+          <a:lstStyle/>
+          <a:p>
+            <a:r>
+              <a:rPr lang="en-US" dirty="0"/>
+              <a:t>Example Model for Learning ”TuhDooP”</a:t>
+            </a:r>
+          </a:p>
+        </p:txBody>
+      </p:sp>
+      <p:sp>
+        <p:nvSpPr>
+          <p:cNvPr id="3" name="Content Placeholder 2">
+            <a:extLst>
+              <a:ext uri="{FF2B5EF4-FFF2-40B4-BE49-F238E27FC236}">
+                <a16:creationId xmlns:a16="http://schemas.microsoft.com/office/drawing/2014/main" id="{E41EC248-84A2-BB6F-61C4-4B04AE8CA702}"/>
+              </a:ext>
+            </a:extLst>
+          </p:cNvPr>
+          <p:cNvSpPr>
+            <a:spLocks noGrp="1"/>
+          </p:cNvSpPr>
+          <p:nvPr>
+            <p:ph idx="1"/>
+          </p:nvPr>
+        </p:nvSpPr>
+        <p:spPr/>
+        <p:txBody>
+          <a:bodyPr/>
+          <a:lstStyle/>
+          <a:p>
+            <a:r>
+              <a:rPr lang="en-US" dirty="0"/>
+              <a:t>Model is a teaching case study in </a:t>
+            </a:r>
+            <a:r>
+              <a:rPr lang="en-US" dirty="0">
+                <a:hlinkClick r:id="rId2"/>
+              </a:rPr>
+              <a:t>Digital Transformation with Excel Online Course</a:t>
+            </a:r>
+            <a:endParaRPr lang="en-US" dirty="0"/>
+          </a:p>
+          <a:p>
+            <a:r>
+              <a:rPr lang="en-US" dirty="0"/>
+              <a:t>We can use its raw and transformed data for validating a Python version</a:t>
+            </a:r>
+          </a:p>
+          <a:p>
+            <a:r>
+              <a:rPr lang="en-US" dirty="0"/>
+              <a:t>Roll Length Model.xlsx - Toilet paper example</a:t>
+            </a:r>
+          </a:p>
+          <a:p>
+            <a:pPr lvl="1"/>
+            <a:r>
+              <a:rPr lang="en-US" dirty="0"/>
+              <a:t>Technical model to calculate length of substrate on a roll based on diameter</a:t>
+            </a:r>
+          </a:p>
+          <a:p>
+            <a:pPr lvl="1"/>
+            <a:r>
+              <a:rPr lang="en-US" dirty="0"/>
+              <a:t>Model is industrially useful in R&amp;D and manufacturing settings</a:t>
+            </a:r>
+          </a:p>
+          <a:p>
+            <a:pPr lvl="1"/>
+            <a:r>
+              <a:rPr lang="en-US" dirty="0"/>
+              <a:t>Example raw data and equation derivation available as background in file</a:t>
+            </a:r>
+          </a:p>
+        </p:txBody>
+      </p:sp>
+      <p:pic>
+        <p:nvPicPr>
+          <p:cNvPr id="4" name="Content Placeholder 7" descr="A roll of toilet paper&#10;&#10;Description automatically generated">
+            <a:extLst>
+              <a:ext uri="{FF2B5EF4-FFF2-40B4-BE49-F238E27FC236}">
+                <a16:creationId xmlns:a16="http://schemas.microsoft.com/office/drawing/2014/main" id="{9E60C435-3239-AC70-F9BF-1ED14145B256}"/>
+              </a:ext>
+            </a:extLst>
+          </p:cNvPr>
+          <p:cNvPicPr>
+            <a:picLocks noChangeAspect="1"/>
+          </p:cNvPicPr>
+          <p:nvPr/>
+        </p:nvPicPr>
+        <p:blipFill>
+          <a:blip r:embed="rId3">
+            <a:extLst>
+              <a:ext uri="{28A0092B-C50C-407E-A947-70E740481C1C}">
+                <a14:useLocalDpi xmlns:a14="http://schemas.microsoft.com/office/drawing/2010/main" val="0"/>
+              </a:ext>
+            </a:extLst>
+          </a:blip>
+          <a:stretch>
+            <a:fillRect/>
+          </a:stretch>
+        </p:blipFill>
+        <p:spPr>
+          <a:xfrm>
+            <a:off x="845319" y="4812949"/>
+            <a:ext cx="1630185" cy="1630185"/>
+          </a:xfrm>
+          <a:prstGeom prst="rect">
+            <a:avLst/>
+          </a:prstGeom>
+        </p:spPr>
+      </p:pic>
+      <p:pic>
+        <p:nvPicPr>
+          <p:cNvPr id="5" name="Picture 4">
+            <a:extLst>
+              <a:ext uri="{FF2B5EF4-FFF2-40B4-BE49-F238E27FC236}">
+                <a16:creationId xmlns:a16="http://schemas.microsoft.com/office/drawing/2014/main" id="{42DE9365-0F03-6105-A208-31485CD121D5}"/>
+              </a:ext>
+            </a:extLst>
+          </p:cNvPr>
+          <p:cNvPicPr>
+            <a:picLocks noChangeAspect="1"/>
+          </p:cNvPicPr>
+          <p:nvPr/>
+        </p:nvPicPr>
+        <p:blipFill>
+          <a:blip r:embed="rId4">
+            <a:extLst>
+              <a:ext uri="{28A0092B-C50C-407E-A947-70E740481C1C}">
+                <a14:useLocalDpi xmlns:a14="http://schemas.microsoft.com/office/drawing/2010/main" val="0"/>
+              </a:ext>
+            </a:extLst>
+          </a:blip>
+          <a:stretch>
+            <a:fillRect/>
+          </a:stretch>
+        </p:blipFill>
+        <p:spPr>
+          <a:xfrm>
+            <a:off x="428854" y="3784741"/>
+            <a:ext cx="8478079" cy="698300"/>
+          </a:xfrm>
+          <a:prstGeom prst="rect">
+            <a:avLst/>
+          </a:prstGeom>
+        </p:spPr>
+      </p:pic>
+      <p:pic>
+        <p:nvPicPr>
+          <p:cNvPr id="6" name="Picture 5" descr="Chart&#10;&#10;Description automatically generated">
+            <a:extLst>
+              <a:ext uri="{FF2B5EF4-FFF2-40B4-BE49-F238E27FC236}">
+                <a16:creationId xmlns:a16="http://schemas.microsoft.com/office/drawing/2014/main" id="{0023C8D4-CAD8-D52A-4CAB-4A4A322DB7B1}"/>
+              </a:ext>
+            </a:extLst>
+          </p:cNvPr>
+          <p:cNvPicPr>
+            <a:picLocks noChangeAspect="1"/>
+          </p:cNvPicPr>
+          <p:nvPr/>
+        </p:nvPicPr>
+        <p:blipFill>
+          <a:blip r:embed="rId5">
+            <a:extLst>
+              <a:ext uri="{28A0092B-C50C-407E-A947-70E740481C1C}">
+                <a14:useLocalDpi xmlns:a14="http://schemas.microsoft.com/office/drawing/2010/main" val="0"/>
+              </a:ext>
+            </a:extLst>
+          </a:blip>
+          <a:stretch>
+            <a:fillRect/>
+          </a:stretch>
+        </p:blipFill>
+        <p:spPr>
+          <a:xfrm>
+            <a:off x="9205408" y="1963463"/>
+            <a:ext cx="2808390" cy="4444410"/>
+          </a:xfrm>
+          <a:prstGeom prst="rect">
+            <a:avLst/>
+          </a:prstGeom>
+        </p:spPr>
+      </p:pic>
+      <p:sp>
+        <p:nvSpPr>
+          <p:cNvPr id="7" name="TextBox 6">
+            <a:extLst>
+              <a:ext uri="{FF2B5EF4-FFF2-40B4-BE49-F238E27FC236}">
+                <a16:creationId xmlns:a16="http://schemas.microsoft.com/office/drawing/2014/main" id="{CFA1672B-F505-38C2-E17E-F55031B8B435}"/>
+              </a:ext>
+            </a:extLst>
+          </p:cNvPr>
+          <p:cNvSpPr txBox="1"/>
+          <p:nvPr/>
+        </p:nvSpPr>
+        <p:spPr>
+          <a:xfrm>
+            <a:off x="9330352" y="1594131"/>
+            <a:ext cx="2808390" cy="369332"/>
+          </a:xfrm>
+          <a:prstGeom prst="rect">
+            <a:avLst/>
+          </a:prstGeom>
+          <a:noFill/>
+        </p:spPr>
+        <p:txBody>
+          <a:bodyPr wrap="square">
+            <a:spAutoFit/>
+          </a:bodyPr>
+          <a:lstStyle/>
+          <a:p>
+            <a:r>
+              <a:rPr lang="en-US" sz="1800" dirty="0">
+                <a:latin typeface="Proxima Nova Lt" panose="02000506030000020004" pitchFamily="2" charset="77"/>
+              </a:rPr>
+              <a:t>Transformed/Linearized</a:t>
+            </a:r>
+            <a:endParaRPr lang="en-US" dirty="0">
+              <a:latin typeface="Proxima Nova Lt" panose="02000506030000020004" pitchFamily="2" charset="77"/>
+            </a:endParaRPr>
+          </a:p>
+        </p:txBody>
+      </p:sp>
+      <p:sp>
+        <p:nvSpPr>
+          <p:cNvPr id="8" name="Right Arrow 7">
+            <a:extLst>
+              <a:ext uri="{FF2B5EF4-FFF2-40B4-BE49-F238E27FC236}">
+                <a16:creationId xmlns:a16="http://schemas.microsoft.com/office/drawing/2014/main" id="{D33AE257-A224-C962-8062-3873C3672B7A}"/>
+              </a:ext>
+            </a:extLst>
+          </p:cNvPr>
+          <p:cNvSpPr/>
+          <p:nvPr/>
+        </p:nvSpPr>
+        <p:spPr>
+          <a:xfrm>
+            <a:off x="2712720" y="4045373"/>
+            <a:ext cx="589280" cy="212227"/>
+          </a:xfrm>
+          <a:prstGeom prst="rightArrow">
+            <a:avLst/>
+          </a:prstGeom>
+        </p:spPr>
+        <p:style>
+          <a:lnRef idx="2">
+            <a:schemeClr val="accent1">
+              <a:shade val="50000"/>
+            </a:schemeClr>
+          </a:lnRef>
+          <a:fillRef idx="1">
+            <a:schemeClr val="accent1"/>
+          </a:fillRef>
+          <a:effectRef idx="0">
+            <a:schemeClr val="accent1"/>
+          </a:effectRef>
+          <a:fontRef idx="minor">
+            <a:schemeClr val="lt1"/>
+          </a:fontRef>
+        </p:style>
+        <p:txBody>
+          <a:bodyPr rtlCol="0" anchor="ctr"/>
+          <a:lstStyle/>
+          <a:p>
+            <a:pPr algn="ctr"/>
+            <a:endParaRPr lang="en-US">
+              <a:latin typeface="Proxima Nova Lt" panose="02000506030000020004" pitchFamily="2" charset="77"/>
+            </a:endParaRPr>
+          </a:p>
+        </p:txBody>
+      </p:sp>
+      <p:sp>
+        <p:nvSpPr>
+          <p:cNvPr id="9" name="Right Arrow 8">
+            <a:extLst>
+              <a:ext uri="{FF2B5EF4-FFF2-40B4-BE49-F238E27FC236}">
+                <a16:creationId xmlns:a16="http://schemas.microsoft.com/office/drawing/2014/main" id="{2EDD7D62-46A3-AFCD-6F6C-3BC79FE5F3DD}"/>
+              </a:ext>
+            </a:extLst>
+          </p:cNvPr>
+          <p:cNvSpPr/>
+          <p:nvPr/>
+        </p:nvSpPr>
+        <p:spPr>
+          <a:xfrm>
+            <a:off x="6533809" y="4045373"/>
+            <a:ext cx="589280" cy="212227"/>
+          </a:xfrm>
+          <a:prstGeom prst="rightArrow">
+            <a:avLst/>
+          </a:prstGeom>
+        </p:spPr>
+        <p:style>
+          <a:lnRef idx="2">
+            <a:schemeClr val="accent1">
+              <a:shade val="50000"/>
+            </a:schemeClr>
+          </a:lnRef>
+          <a:fillRef idx="1">
+            <a:schemeClr val="accent1"/>
+          </a:fillRef>
+          <a:effectRef idx="0">
+            <a:schemeClr val="accent1"/>
+          </a:effectRef>
+          <a:fontRef idx="minor">
+            <a:schemeClr val="lt1"/>
+          </a:fontRef>
+        </p:style>
+        <p:txBody>
+          <a:bodyPr rtlCol="0" anchor="ctr"/>
+          <a:lstStyle/>
+          <a:p>
+            <a:pPr algn="ctr"/>
+            <a:endParaRPr lang="en-US">
+              <a:latin typeface="Proxima Nova Lt" panose="02000506030000020004" pitchFamily="2" charset="77"/>
+            </a:endParaRPr>
+          </a:p>
+        </p:txBody>
+      </p:sp>
+      <p:sp>
+        <p:nvSpPr>
+          <p:cNvPr id="10" name="Footer Placeholder 9">
+            <a:extLst>
+              <a:ext uri="{FF2B5EF4-FFF2-40B4-BE49-F238E27FC236}">
+                <a16:creationId xmlns:a16="http://schemas.microsoft.com/office/drawing/2014/main" id="{C8BEC954-E706-F412-5EA9-537F67EBE9E6}"/>
+              </a:ext>
+            </a:extLst>
+          </p:cNvPr>
+          <p:cNvSpPr>
+            <a:spLocks noGrp="1"/>
+          </p:cNvSpPr>
+          <p:nvPr>
+            <p:ph type="ftr" sz="quarter" idx="11"/>
+          </p:nvPr>
+        </p:nvSpPr>
+        <p:spPr/>
+        <p:txBody>
+          <a:bodyPr/>
+          <a:lstStyle/>
+          <a:p>
+            <a:r>
+              <a:rPr lang="en-US"/>
+              <a:t>Shared under MIT Open-Source License - Copyright 2023 Data Delve Engineer LLC</a:t>
+            </a:r>
+            <a:endParaRPr lang="en-US" dirty="0"/>
+          </a:p>
+        </p:txBody>
+      </p:sp>
+    </p:spTree>
+    <p:extLst>
+      <p:ext uri="{BB962C8B-B14F-4D97-AF65-F5344CB8AC3E}">
+        <p14:creationId xmlns:p14="http://schemas.microsoft.com/office/powerpoint/2010/main" val="1805537388"/>
+      </p:ext>
+    </p:extLst>
+  </p:cSld>
+  <p:clrMapOvr>
+    <a:masterClrMapping/>
+  </p:clrMapOvr>
+</p:sld>
+</file>
+
 <file path=ppt/slides/slide2.xml><?xml version="1.0" encoding="utf-8"?>
 <p:sld xmlns:a="http://schemas.openxmlformats.org/drawingml/2006/main" xmlns:r="http://schemas.openxmlformats.org/officeDocument/2006/relationships" xmlns:p="http://schemas.openxmlformats.org/presentationml/2006/main">
   <p:cSld>
@@ -10027,7 +10858,7 @@
             <p:ph idx="1"/>
             <p:extLst>
               <p:ext uri="{D42A27DB-BD31-4B8C-83A1-F6EECF244321}">
-                <p14:modId xmlns:p14="http://schemas.microsoft.com/office/powerpoint/2010/main" val="4163198178"/>
+                <p14:modId xmlns:p14="http://schemas.microsoft.com/office/powerpoint/2010/main" val="3535635492"/>
               </p:ext>
             </p:extLst>
           </p:nvPr>
@@ -10111,10 +10942,10 @@
       </p:grpSpPr>
       <p:sp useBgFill="1">
         <p:nvSpPr>
-          <p:cNvPr id="16" name="Rectangle 15">
+          <p:cNvPr id="17" name="Rectangle 16">
             <a:extLst>
               <a:ext uri="{FF2B5EF4-FFF2-40B4-BE49-F238E27FC236}">
-                <a16:creationId xmlns:a16="http://schemas.microsoft.com/office/drawing/2014/main" id="{B8DD2392-397B-48BF-BEFA-EA1FB881CA85}"/>
+                <a16:creationId xmlns:a16="http://schemas.microsoft.com/office/drawing/2014/main" id="{504BED40-EAF7-4E55-AFF7-2CD840EBD3AA}"/>
               </a:ext>
               <a:ext uri="{C183D7F6-B498-43B3-948B-1728B52AA6E4}">
                 <adec:decorative xmlns:adec="http://schemas.microsoft.com/office/drawing/2017/decorative" val="1"/>
@@ -10169,6 +11000,350 @@
           </a:p>
         </p:txBody>
       </p:sp>
+      <p:sp>
+        <p:nvSpPr>
+          <p:cNvPr id="2" name="Title 1">
+            <a:extLst>
+              <a:ext uri="{FF2B5EF4-FFF2-40B4-BE49-F238E27FC236}">
+                <a16:creationId xmlns:a16="http://schemas.microsoft.com/office/drawing/2014/main" id="{5C592CCD-980E-5BE2-B097-69F7E0161B17}"/>
+              </a:ext>
+            </a:extLst>
+          </p:cNvPr>
+          <p:cNvSpPr>
+            <a:spLocks noGrp="1"/>
+          </p:cNvSpPr>
+          <p:nvPr>
+            <p:ph type="title"/>
+          </p:nvPr>
+        </p:nvSpPr>
+        <p:spPr>
+          <a:xfrm>
+            <a:off x="581193" y="702156"/>
+            <a:ext cx="6309003" cy="1013800"/>
+          </a:xfrm>
+        </p:spPr>
+        <p:txBody>
+          <a:bodyPr>
+            <a:normAutofit/>
+          </a:bodyPr>
+          <a:lstStyle/>
+          <a:p>
+            <a:r>
+              <a:rPr lang="en-US">
+                <a:solidFill>
+                  <a:schemeClr val="tx2"/>
+                </a:solidFill>
+              </a:rPr>
+              <a:t>Characteristics of Good Models and Analysis Pipelines</a:t>
+            </a:r>
+          </a:p>
+        </p:txBody>
+      </p:sp>
+      <p:sp>
+        <p:nvSpPr>
+          <p:cNvPr id="19" name="Rectangle 18">
+            <a:extLst>
+              <a:ext uri="{FF2B5EF4-FFF2-40B4-BE49-F238E27FC236}">
+                <a16:creationId xmlns:a16="http://schemas.microsoft.com/office/drawing/2014/main" id="{F367CCF1-BB1E-41CF-8499-94A870C33EFA}"/>
+              </a:ext>
+              <a:ext uri="{C183D7F6-B498-43B3-948B-1728B52AA6E4}">
+                <adec:decorative xmlns:adec="http://schemas.microsoft.com/office/drawing/2017/decorative" val="1"/>
+              </a:ext>
+            </a:extLst>
+          </p:cNvPr>
+          <p:cNvSpPr>
+            <a:spLocks noGrp="1" noRot="1" noChangeAspect="1" noMove="1" noResize="1" noEditPoints="1" noAdjustHandles="1" noChangeArrowheads="1" noChangeShapeType="1" noTextEdit="1"/>
+          </p:cNvSpPr>
+          <p:nvPr>
+            <p:extLst>
+              <p:ext uri="{386F3935-93C4-4BCD-93E2-E3B085C9AB24}">
+                <p16:designElem xmlns:p16="http://schemas.microsoft.com/office/powerpoint/2015/main" val="1"/>
+              </p:ext>
+            </p:extLst>
+          </p:nvPr>
+        </p:nvSpPr>
+        <p:spPr>
+          <a:xfrm>
+            <a:off x="446534" y="457200"/>
+            <a:ext cx="6675120" cy="94997"/>
+          </a:xfrm>
+          <a:prstGeom prst="rect">
+            <a:avLst/>
+          </a:prstGeom>
+          <a:solidFill>
+            <a:schemeClr val="accent1"/>
+          </a:solidFill>
+          <a:ln>
+            <a:noFill/>
+          </a:ln>
+          <a:effectLst/>
+        </p:spPr>
+        <p:style>
+          <a:lnRef idx="1">
+            <a:schemeClr val="accent1"/>
+          </a:lnRef>
+          <a:fillRef idx="3">
+            <a:schemeClr val="accent1"/>
+          </a:fillRef>
+          <a:effectRef idx="2">
+            <a:schemeClr val="accent1"/>
+          </a:effectRef>
+          <a:fontRef idx="minor">
+            <a:schemeClr val="lt1"/>
+          </a:fontRef>
+        </p:style>
+      </p:sp>
+      <p:sp>
+        <p:nvSpPr>
+          <p:cNvPr id="3" name="Content Placeholder 2">
+            <a:extLst>
+              <a:ext uri="{FF2B5EF4-FFF2-40B4-BE49-F238E27FC236}">
+                <a16:creationId xmlns:a16="http://schemas.microsoft.com/office/drawing/2014/main" id="{A483A1BC-F3EA-D2B7-3F54-75332C033E82}"/>
+              </a:ext>
+            </a:extLst>
+          </p:cNvPr>
+          <p:cNvSpPr>
+            <a:spLocks noGrp="1"/>
+          </p:cNvSpPr>
+          <p:nvPr>
+            <p:ph idx="1"/>
+          </p:nvPr>
+        </p:nvSpPr>
+        <p:spPr>
+          <a:xfrm>
+            <a:off x="581194" y="1896533"/>
+            <a:ext cx="6309003" cy="3962266"/>
+          </a:xfrm>
+        </p:spPr>
+        <p:txBody>
+          <a:bodyPr>
+            <a:normAutofit/>
+          </a:bodyPr>
+          <a:lstStyle/>
+          <a:p>
+            <a:r>
+              <a:rPr lang="en-US" dirty="0">
+                <a:solidFill>
+                  <a:schemeClr val="tx2"/>
+                </a:solidFill>
+              </a:rPr>
+              <a:t>Good models and analyses are </a:t>
+            </a:r>
+            <a:r>
+              <a:rPr lang="en-US" b="1" dirty="0">
+                <a:solidFill>
+                  <a:schemeClr val="tx2"/>
+                </a:solidFill>
+              </a:rPr>
+              <a:t>curated</a:t>
+            </a:r>
+            <a:r>
+              <a:rPr lang="en-US" dirty="0">
+                <a:solidFill>
+                  <a:schemeClr val="tx2"/>
+                </a:solidFill>
+              </a:rPr>
+              <a:t>. Another knowledgeable human can look at the files and not only repeat the analysis but extend it without the author being present.</a:t>
+            </a:r>
+          </a:p>
+          <a:p>
+            <a:r>
+              <a:rPr lang="en-US" dirty="0">
+                <a:solidFill>
+                  <a:schemeClr val="tx2"/>
+                </a:solidFill>
+              </a:rPr>
+              <a:t>Good models and analyses are </a:t>
+            </a:r>
+            <a:r>
+              <a:rPr lang="en-US" b="1" dirty="0">
+                <a:solidFill>
+                  <a:schemeClr val="tx2"/>
+                </a:solidFill>
+              </a:rPr>
+              <a:t>validated</a:t>
+            </a:r>
+            <a:r>
+              <a:rPr lang="en-US" dirty="0">
+                <a:solidFill>
+                  <a:schemeClr val="tx2"/>
+                </a:solidFill>
+              </a:rPr>
+              <a:t>. They come with test cases consisting of mocked up data proving correctness of calculations, data cleaning steps and output generation. Ideally, the validation is automated to be re-run as changes are made</a:t>
+            </a:r>
+          </a:p>
+          <a:p>
+            <a:r>
+              <a:rPr lang="en-US" dirty="0">
+                <a:solidFill>
+                  <a:schemeClr val="tx2"/>
+                </a:solidFill>
+              </a:rPr>
+              <a:t>Good models are </a:t>
+            </a:r>
+            <a:r>
+              <a:rPr lang="en-US" b="1" dirty="0">
+                <a:solidFill>
+                  <a:schemeClr val="tx2"/>
+                </a:solidFill>
+              </a:rPr>
+              <a:t>maintainable</a:t>
+            </a:r>
+            <a:r>
+              <a:rPr lang="en-US" dirty="0">
+                <a:solidFill>
+                  <a:schemeClr val="tx2"/>
+                </a:solidFill>
+              </a:rPr>
+              <a:t> and </a:t>
+            </a:r>
+            <a:r>
+              <a:rPr lang="en-US" b="1" dirty="0">
+                <a:solidFill>
+                  <a:schemeClr val="tx2"/>
+                </a:solidFill>
+              </a:rPr>
+              <a:t>extensible</a:t>
+            </a:r>
+            <a:r>
+              <a:rPr lang="en-US" dirty="0">
+                <a:solidFill>
+                  <a:schemeClr val="tx2"/>
+                </a:solidFill>
+              </a:rPr>
+              <a:t>. They are written in a modular way, so that they are easy to build on and easy to reapply.</a:t>
+            </a:r>
+          </a:p>
+          <a:p>
+            <a:endParaRPr lang="en-US" dirty="0">
+              <a:solidFill>
+                <a:schemeClr val="tx2"/>
+              </a:solidFill>
+            </a:endParaRPr>
+          </a:p>
+          <a:p>
+            <a:endParaRPr lang="en-US" dirty="0">
+              <a:solidFill>
+                <a:schemeClr val="tx2"/>
+              </a:solidFill>
+            </a:endParaRPr>
+          </a:p>
+        </p:txBody>
+      </p:sp>
+      <p:sp>
+        <p:nvSpPr>
+          <p:cNvPr id="4" name="Footer Placeholder 3">
+            <a:extLst>
+              <a:ext uri="{FF2B5EF4-FFF2-40B4-BE49-F238E27FC236}">
+                <a16:creationId xmlns:a16="http://schemas.microsoft.com/office/drawing/2014/main" id="{8F02802B-C722-C519-5755-C8CD81A88A75}"/>
+              </a:ext>
+            </a:extLst>
+          </p:cNvPr>
+          <p:cNvSpPr>
+            <a:spLocks noGrp="1"/>
+          </p:cNvSpPr>
+          <p:nvPr>
+            <p:ph type="ftr" sz="quarter" idx="11"/>
+          </p:nvPr>
+        </p:nvSpPr>
+        <p:spPr>
+          <a:xfrm>
+            <a:off x="581193" y="5951811"/>
+            <a:ext cx="4277410" cy="365125"/>
+          </a:xfrm>
+        </p:spPr>
+        <p:txBody>
+          <a:bodyPr>
+            <a:normAutofit/>
+          </a:bodyPr>
+          <a:lstStyle/>
+          <a:p>
+            <a:pPr>
+              <a:lnSpc>
+                <a:spcPct val="90000"/>
+              </a:lnSpc>
+              <a:spcAft>
+                <a:spcPts val="600"/>
+              </a:spcAft>
+            </a:pPr>
+            <a:r>
+              <a:rPr lang="en-US">
+                <a:solidFill>
+                  <a:srgbClr val="A8A27B"/>
+                </a:solidFill>
+              </a:rPr>
+              <a:t>Shared under MIT Open-Source License - Copyright 2023 Data Delve Engineer LLC</a:t>
+            </a:r>
+          </a:p>
+        </p:txBody>
+      </p:sp>
+      <p:pic>
+        <p:nvPicPr>
+          <p:cNvPr id="6" name="Picture 5" descr="Light bulb on yellow background with sketched light beams and cord">
+            <a:extLst>
+              <a:ext uri="{FF2B5EF4-FFF2-40B4-BE49-F238E27FC236}">
+                <a16:creationId xmlns:a16="http://schemas.microsoft.com/office/drawing/2014/main" id="{20129C6F-C7E7-E64A-5217-207E98908870}"/>
+              </a:ext>
+            </a:extLst>
+          </p:cNvPr>
+          <p:cNvPicPr>
+            <a:picLocks noChangeAspect="1"/>
+          </p:cNvPicPr>
+          <p:nvPr/>
+        </p:nvPicPr>
+        <p:blipFill rotWithShape="1">
+          <a:blip r:embed="rId2"/>
+          <a:srcRect l="51212" r="6902"/>
+          <a:stretch/>
+        </p:blipFill>
+        <p:spPr>
+          <a:xfrm>
+            <a:off x="7521283" y="10"/>
+            <a:ext cx="4670717" cy="6857990"/>
+          </a:xfrm>
+          <a:prstGeom prst="rect">
+            <a:avLst/>
+          </a:prstGeom>
+        </p:spPr>
+      </p:pic>
+    </p:spTree>
+    <p:extLst>
+      <p:ext uri="{BB962C8B-B14F-4D97-AF65-F5344CB8AC3E}">
+        <p14:creationId xmlns:p14="http://schemas.microsoft.com/office/powerpoint/2010/main" val="1688156240"/>
+      </p:ext>
+    </p:extLst>
+  </p:cSld>
+  <p:clrMapOvr>
+    <a:masterClrMapping/>
+  </p:clrMapOvr>
+</p:sld>
+</file>
+
+<file path=ppt/slides/slide5.xml><?xml version="1.0" encoding="utf-8"?>
+<p:sld xmlns:a="http://schemas.openxmlformats.org/drawingml/2006/main" xmlns:r="http://schemas.openxmlformats.org/officeDocument/2006/relationships" xmlns:p="http://schemas.openxmlformats.org/presentationml/2006/main">
+  <p:cSld>
+    <p:bg>
+      <p:bgPr>
+        <a:solidFill>
+          <a:schemeClr val="bg1"/>
+        </a:solidFill>
+        <a:effectLst/>
+      </p:bgPr>
+    </p:bg>
+    <p:spTree>
+      <p:nvGrpSpPr>
+        <p:cNvPr id="1" name=""/>
+        <p:cNvGrpSpPr/>
+        <p:nvPr/>
+      </p:nvGrpSpPr>
+      <p:grpSpPr>
+        <a:xfrm>
+          <a:off x="0" y="0"/>
+          <a:ext cx="0" cy="0"/>
+          <a:chOff x="0" y="0"/>
+          <a:chExt cx="0" cy="0"/>
+        </a:xfrm>
+      </p:grpSpPr>
       <p:pic>
         <p:nvPicPr>
           <p:cNvPr id="5" name="Picture 4" descr="Computer script on a screen">
@@ -10218,8 +11393,8 @@
         </p:nvSpPr>
         <p:spPr>
           <a:xfrm>
-            <a:off x="1023870" y="702156"/>
-            <a:ext cx="10144260" cy="1013800"/>
+            <a:off x="581192" y="702156"/>
+            <a:ext cx="11029616" cy="689674"/>
           </a:xfrm>
         </p:spPr>
         <p:txBody>
@@ -10229,11 +11404,7 @@
           <a:lstStyle/>
           <a:p>
             <a:r>
-              <a:rPr lang="en-US">
-                <a:solidFill>
-                  <a:schemeClr val="tx1"/>
-                </a:solidFill>
-              </a:rPr>
+              <a:rPr lang="en-US"/>
               <a:t>Takeaways For You From these Workshops</a:t>
             </a:r>
           </a:p>
@@ -10257,8 +11428,8 @@
         </p:nvSpPr>
         <p:spPr>
           <a:xfrm>
-            <a:off x="965199" y="2180496"/>
-            <a:ext cx="10261602" cy="3678303"/>
+            <a:off x="581192" y="1594131"/>
+            <a:ext cx="11029615" cy="4381219"/>
           </a:xfrm>
         </p:spPr>
         <p:txBody>
@@ -10267,150 +11438,78 @@
           </a:bodyPr>
           <a:lstStyle/>
           <a:p>
-            <a:pPr>
-              <a:lnSpc>
-                <a:spcPct val="90000"/>
-              </a:lnSpc>
-            </a:pPr>
+            <a:r>
+              <a:rPr lang="en-US" sz="1800" dirty="0"/>
+              <a:t>Grow in your ability to architect your projects for personal efficiency and collaboration</a:t>
+            </a:r>
+          </a:p>
+          <a:p>
+            <a:pPr lvl="1"/>
+            <a:r>
+              <a:rPr lang="en-US" sz="1600" dirty="0"/>
+              <a:t>Learn to distinguish Python code by a 3-level architecture quality scale</a:t>
+            </a:r>
+          </a:p>
+          <a:p>
+            <a:pPr lvl="1"/>
+            <a:r>
+              <a:rPr lang="en-US" sz="1600" dirty="0"/>
+              <a:t>Practice creating Level 2 (aka Jupyter notebook arranging functions into ”procedures”) code for models</a:t>
+            </a:r>
+          </a:p>
+          <a:p>
+            <a:pPr lvl="1"/>
+            <a:r>
+              <a:rPr lang="en-US" sz="1600" dirty="0"/>
+              <a:t>Learn basic elements of a Level 3 approach</a:t>
+            </a:r>
+          </a:p>
+          <a:p>
+            <a:pPr lvl="2"/>
+            <a:r>
+              <a:rPr lang="en-US" sz="1400" dirty="0"/>
+              <a:t>Jupyter “dashboard” + *.py code structure</a:t>
+            </a:r>
+          </a:p>
+          <a:p>
+            <a:pPr lvl="2"/>
+            <a:r>
+              <a:rPr lang="en-US" sz="1400" dirty="0"/>
+              <a:t>”Tuhdoop” combination of pre-written Pytest validation (TDD) and object-oriented programming with Python classes (OOP)</a:t>
+            </a:r>
+          </a:p>
+          <a:p>
+            <a:r>
+              <a:rPr lang="en-US" sz="1800" dirty="0"/>
+              <a:t>Learn folder structures and projfiles.py file management library helpful for curating and collaboration</a:t>
+            </a:r>
+          </a:p>
+          <a:p>
+            <a:pPr lvl="1"/>
             <a:r>
               <a:rPr lang="en-US" sz="1500" dirty="0"/>
-              <a:t>Learn an intuitive folder structure and associated code for curating and collaboration</a:t>
-            </a:r>
-          </a:p>
-          <a:p>
-            <a:pPr lvl="1">
-              <a:lnSpc>
-                <a:spcPct val="90000"/>
-              </a:lnSpc>
-            </a:pPr>
-            <a:r>
-              <a:rPr lang="en-US" sz="1500" dirty="0"/>
-              <a:t>Model connects naturally to needed data and *.</a:t>
-            </a:r>
-            <a:r>
-              <a:rPr lang="en-US" sz="1500" dirty="0" err="1"/>
-              <a:t>py</a:t>
-            </a:r>
-            <a:r>
-              <a:rPr lang="en-US" sz="1500" dirty="0"/>
-              <a:t> libraries</a:t>
-            </a:r>
-          </a:p>
-          <a:p>
-            <a:pPr lvl="1">
-              <a:lnSpc>
-                <a:spcPct val="90000"/>
-              </a:lnSpc>
-            </a:pPr>
+              <a:t>Model connects naturally to needed data and *.py libraries</a:t>
+            </a:r>
+          </a:p>
+          <a:p>
+            <a:pPr lvl="1"/>
             <a:r>
               <a:rPr lang="en-US" sz="1500" dirty="0"/>
               <a:t>Toggle freely between test and “production” modes to encourage validation</a:t>
             </a:r>
           </a:p>
           <a:p>
-            <a:pPr lvl="1">
-              <a:lnSpc>
-                <a:spcPct val="90000"/>
-              </a:lnSpc>
-            </a:pPr>
+            <a:pPr lvl="1"/>
             <a:r>
               <a:rPr lang="en-US" sz="1500" dirty="0"/>
               <a:t>Version control and ability to “use” a model while continuing to develop</a:t>
             </a:r>
           </a:p>
           <a:p>
-            <a:pPr>
-              <a:lnSpc>
-                <a:spcPct val="90000"/>
-              </a:lnSpc>
-            </a:pPr>
-            <a:r>
-              <a:rPr lang="en-US" sz="1500" dirty="0"/>
-              <a:t>Grow in your ability to architect your projects for personal efficiency and collaboration</a:t>
-            </a:r>
-          </a:p>
-          <a:p>
-            <a:pPr lvl="1">
-              <a:lnSpc>
-                <a:spcPct val="90000"/>
-              </a:lnSpc>
-            </a:pPr>
-            <a:r>
-              <a:rPr lang="en-US" sz="1500" dirty="0"/>
-              <a:t>Move to a modular, object-oriented approach (e.g. away from “spaghetti code”/rambling Jupyter scroll)</a:t>
-            </a:r>
-          </a:p>
-          <a:p>
-            <a:pPr lvl="1">
-              <a:lnSpc>
-                <a:spcPct val="90000"/>
-              </a:lnSpc>
-            </a:pPr>
-            <a:r>
-              <a:rPr lang="en-US" sz="1500" dirty="0"/>
-              <a:t>Learn Pytest and Test-Driven Development for validating models and data pipelines</a:t>
-            </a:r>
-          </a:p>
-          <a:p>
-            <a:pPr>
-              <a:lnSpc>
-                <a:spcPct val="90000"/>
-              </a:lnSpc>
-            </a:pPr>
-            <a:r>
-              <a:rPr lang="en-US" sz="1500" dirty="0"/>
+            <a:r>
+              <a:rPr lang="en-US" sz="1800" dirty="0"/>
               <a:t>Gain a planning template you can use to get organized</a:t>
             </a:r>
-          </a:p>
-          <a:p>
-            <a:pPr>
-              <a:lnSpc>
-                <a:spcPct val="90000"/>
-              </a:lnSpc>
-            </a:pPr>
-            <a:endParaRPr lang="en-US" sz="1500" dirty="0"/>
-          </a:p>
-          <a:p>
-            <a:pPr marL="0" indent="0">
-              <a:lnSpc>
-                <a:spcPct val="90000"/>
-              </a:lnSpc>
-              <a:buNone/>
-            </a:pPr>
-            <a:r>
-              <a:rPr lang="en-US" sz="1500" dirty="0"/>
-              <a:t>Insights (Definitions on next slide): </a:t>
-            </a:r>
-          </a:p>
-          <a:p>
-            <a:pPr>
-              <a:lnSpc>
-                <a:spcPct val="90000"/>
-              </a:lnSpc>
-            </a:pPr>
-            <a:r>
-              <a:rPr lang="en-US" sz="1500" dirty="0"/>
-              <a:t>Lots of people talk about Object-Oriented Programming and TDD as separate topics. Nobody mentions how amazing they are together!!</a:t>
-            </a:r>
-          </a:p>
-          <a:p>
-            <a:pPr>
-              <a:lnSpc>
-                <a:spcPct val="90000"/>
-              </a:lnSpc>
-            </a:pPr>
-            <a:r>
-              <a:rPr lang="en-US" sz="1500" dirty="0"/>
-              <a:t>Computer science basics are foreign to many/most engineers who code. That limits most corporate models </a:t>
-            </a:r>
-          </a:p>
-          <a:p>
-            <a:pPr lvl="1">
-              <a:lnSpc>
-                <a:spcPct val="90000"/>
-              </a:lnSpc>
-            </a:pPr>
-            <a:endParaRPr lang="en-US" sz="1500" dirty="0"/>
           </a:p>
         </p:txBody>
       </p:sp>
@@ -10430,7 +11529,12 @@
             <p:ph type="ftr" sz="quarter" idx="11"/>
           </p:nvPr>
         </p:nvSpPr>
-        <p:spPr/>
+        <p:spPr>
+          <a:xfrm>
+            <a:off x="581192" y="6423914"/>
+            <a:ext cx="6917210" cy="365125"/>
+          </a:xfrm>
+        </p:spPr>
         <p:txBody>
           <a:bodyPr/>
           <a:lstStyle/>
@@ -10456,7 +11560,7 @@
 </p:sld>
 </file>
 
-<file path=ppt/slides/slide5.xml><?xml version="1.0" encoding="utf-8"?>
+<file path=ppt/slides/slide6.xml><?xml version="1.0" encoding="utf-8"?>
 <p:sld xmlns:a="http://schemas.openxmlformats.org/drawingml/2006/main" xmlns:r="http://schemas.openxmlformats.org/officeDocument/2006/relationships" xmlns:p="http://schemas.openxmlformats.org/presentationml/2006/main">
   <p:cSld>
     <p:spTree>
@@ -10750,7 +11854,7 @@
 </p:sld>
 </file>
 
-<file path=ppt/slides/slide6.xml><?xml version="1.0" encoding="utf-8"?>
+<file path=ppt/slides/slide7.xml><?xml version="1.0" encoding="utf-8"?>
 <p:sld xmlns:a="http://schemas.openxmlformats.org/drawingml/2006/main" xmlns:r="http://schemas.openxmlformats.org/officeDocument/2006/relationships" xmlns:p="http://schemas.openxmlformats.org/presentationml/2006/main">
   <p:cSld>
     <p:spTree>
@@ -10972,7 +12076,7 @@
 </p:sld>
 </file>
 
-<file path=ppt/slides/slide7.xml><?xml version="1.0" encoding="utf-8"?>
+<file path=ppt/slides/slide8.xml><?xml version="1.0" encoding="utf-8"?>
 <p:sld xmlns:a="http://schemas.openxmlformats.org/drawingml/2006/main" xmlns:r="http://schemas.openxmlformats.org/officeDocument/2006/relationships" xmlns:p="http://schemas.openxmlformats.org/presentationml/2006/main">
   <p:cSld>
     <p:spTree>
@@ -11210,7 +12314,7 @@
 </p:sld>
 </file>
 
-<file path=ppt/slides/slide8.xml><?xml version="1.0" encoding="utf-8"?>
+<file path=ppt/slides/slide9.xml><?xml version="1.0" encoding="utf-8"?>
 <p:sld xmlns:a="http://schemas.openxmlformats.org/drawingml/2006/main" xmlns:r="http://schemas.openxmlformats.org/officeDocument/2006/relationships" xmlns:p="http://schemas.openxmlformats.org/presentationml/2006/main">
   <p:cSld>
     <p:bg>
@@ -11959,405 +13063,6 @@
     <p:extLst>
       <p:ext uri="{BB962C8B-B14F-4D97-AF65-F5344CB8AC3E}">
         <p14:creationId xmlns:p14="http://schemas.microsoft.com/office/powerpoint/2010/main" val="2127012854"/>
-      </p:ext>
-    </p:extLst>
-  </p:cSld>
-  <p:clrMapOvr>
-    <a:masterClrMapping/>
-  </p:clrMapOvr>
-</p:sld>
-</file>
-
-<file path=ppt/slides/slide9.xml><?xml version="1.0" encoding="utf-8"?>
-<p:sld xmlns:a="http://schemas.openxmlformats.org/drawingml/2006/main" xmlns:r="http://schemas.openxmlformats.org/officeDocument/2006/relationships" xmlns:p="http://schemas.openxmlformats.org/presentationml/2006/main">
-  <p:cSld>
-    <p:spTree>
-      <p:nvGrpSpPr>
-        <p:cNvPr id="1" name=""/>
-        <p:cNvGrpSpPr/>
-        <p:nvPr/>
-      </p:nvGrpSpPr>
-      <p:grpSpPr>
-        <a:xfrm>
-          <a:off x="0" y="0"/>
-          <a:ext cx="0" cy="0"/>
-          <a:chOff x="0" y="0"/>
-          <a:chExt cx="0" cy="0"/>
-        </a:xfrm>
-      </p:grpSpPr>
-      <p:sp>
-        <p:nvSpPr>
-          <p:cNvPr id="2" name="Title 1">
-            <a:extLst>
-              <a:ext uri="{FF2B5EF4-FFF2-40B4-BE49-F238E27FC236}">
-                <a16:creationId xmlns:a16="http://schemas.microsoft.com/office/drawing/2014/main" id="{72221BA9-4A0C-DB0E-A156-182A01FB13B8}"/>
-              </a:ext>
-            </a:extLst>
-          </p:cNvPr>
-          <p:cNvSpPr>
-            <a:spLocks noGrp="1"/>
-          </p:cNvSpPr>
-          <p:nvPr>
-            <p:ph type="title"/>
-          </p:nvPr>
-        </p:nvSpPr>
-        <p:spPr/>
-        <p:txBody>
-          <a:bodyPr/>
-          <a:lstStyle/>
-          <a:p>
-            <a:r>
-              <a:rPr lang="en-US" dirty="0"/>
-              <a:t>Example Model for Learning ”TuhDooP”</a:t>
-            </a:r>
-          </a:p>
-        </p:txBody>
-      </p:sp>
-      <p:sp>
-        <p:nvSpPr>
-          <p:cNvPr id="3" name="Content Placeholder 2">
-            <a:extLst>
-              <a:ext uri="{FF2B5EF4-FFF2-40B4-BE49-F238E27FC236}">
-                <a16:creationId xmlns:a16="http://schemas.microsoft.com/office/drawing/2014/main" id="{E41EC248-84A2-BB6F-61C4-4B04AE8CA702}"/>
-              </a:ext>
-            </a:extLst>
-          </p:cNvPr>
-          <p:cNvSpPr>
-            <a:spLocks noGrp="1"/>
-          </p:cNvSpPr>
-          <p:nvPr>
-            <p:ph idx="1"/>
-          </p:nvPr>
-        </p:nvSpPr>
-        <p:spPr/>
-        <p:txBody>
-          <a:bodyPr/>
-          <a:lstStyle/>
-          <a:p>
-            <a:r>
-              <a:rPr lang="en-US" dirty="0"/>
-              <a:t>Model is a teaching case study in </a:t>
-            </a:r>
-            <a:r>
-              <a:rPr lang="en-US" dirty="0">
-                <a:hlinkClick r:id="rId2"/>
-              </a:rPr>
-              <a:t>Digital Transformation with Excel Online Course</a:t>
-            </a:r>
-            <a:endParaRPr lang="en-US" dirty="0"/>
-          </a:p>
-          <a:p>
-            <a:r>
-              <a:rPr lang="en-US" dirty="0"/>
-              <a:t>We can use its raw and transformed data for validating a Python version</a:t>
-            </a:r>
-          </a:p>
-          <a:p>
-            <a:r>
-              <a:rPr lang="en-US" dirty="0"/>
-              <a:t>Roll Length Model.xlsx - Toilet paper example</a:t>
-            </a:r>
-          </a:p>
-          <a:p>
-            <a:pPr lvl="1"/>
-            <a:r>
-              <a:rPr lang="en-US" dirty="0"/>
-              <a:t>Technical model to calculate length of substrate on a roll based on diameter</a:t>
-            </a:r>
-          </a:p>
-          <a:p>
-            <a:pPr lvl="1"/>
-            <a:r>
-              <a:rPr lang="en-US" dirty="0"/>
-              <a:t>Model is industrially useful in R&amp;D and manufacturing settings</a:t>
-            </a:r>
-          </a:p>
-          <a:p>
-            <a:pPr lvl="1"/>
-            <a:r>
-              <a:rPr lang="en-US" dirty="0"/>
-              <a:t>Example raw data and equation derivation available as background in file</a:t>
-            </a:r>
-          </a:p>
-        </p:txBody>
-      </p:sp>
-      <p:pic>
-        <p:nvPicPr>
-          <p:cNvPr id="4" name="Content Placeholder 7" descr="A roll of toilet paper&#10;&#10;Description automatically generated">
-            <a:extLst>
-              <a:ext uri="{FF2B5EF4-FFF2-40B4-BE49-F238E27FC236}">
-                <a16:creationId xmlns:a16="http://schemas.microsoft.com/office/drawing/2014/main" id="{9E60C435-3239-AC70-F9BF-1ED14145B256}"/>
-              </a:ext>
-            </a:extLst>
-          </p:cNvPr>
-          <p:cNvPicPr>
-            <a:picLocks noChangeAspect="1"/>
-          </p:cNvPicPr>
-          <p:nvPr/>
-        </p:nvPicPr>
-        <p:blipFill>
-          <a:blip r:embed="rId3">
-            <a:extLst>
-              <a:ext uri="{28A0092B-C50C-407E-A947-70E740481C1C}">
-                <a14:useLocalDpi xmlns:a14="http://schemas.microsoft.com/office/drawing/2010/main" val="0"/>
-              </a:ext>
-            </a:extLst>
-          </a:blip>
-          <a:stretch>
-            <a:fillRect/>
-          </a:stretch>
-        </p:blipFill>
-        <p:spPr>
-          <a:xfrm>
-            <a:off x="845319" y="4812949"/>
-            <a:ext cx="1630185" cy="1630185"/>
-          </a:xfrm>
-          <a:prstGeom prst="rect">
-            <a:avLst/>
-          </a:prstGeom>
-        </p:spPr>
-      </p:pic>
-      <p:pic>
-        <p:nvPicPr>
-          <p:cNvPr id="5" name="Picture 4">
-            <a:extLst>
-              <a:ext uri="{FF2B5EF4-FFF2-40B4-BE49-F238E27FC236}">
-                <a16:creationId xmlns:a16="http://schemas.microsoft.com/office/drawing/2014/main" id="{42DE9365-0F03-6105-A208-31485CD121D5}"/>
-              </a:ext>
-            </a:extLst>
-          </p:cNvPr>
-          <p:cNvPicPr>
-            <a:picLocks noChangeAspect="1"/>
-          </p:cNvPicPr>
-          <p:nvPr/>
-        </p:nvPicPr>
-        <p:blipFill>
-          <a:blip r:embed="rId4">
-            <a:extLst>
-              <a:ext uri="{28A0092B-C50C-407E-A947-70E740481C1C}">
-                <a14:useLocalDpi xmlns:a14="http://schemas.microsoft.com/office/drawing/2010/main" val="0"/>
-              </a:ext>
-            </a:extLst>
-          </a:blip>
-          <a:stretch>
-            <a:fillRect/>
-          </a:stretch>
-        </p:blipFill>
-        <p:spPr>
-          <a:xfrm>
-            <a:off x="428854" y="3784741"/>
-            <a:ext cx="8478079" cy="698300"/>
-          </a:xfrm>
-          <a:prstGeom prst="rect">
-            <a:avLst/>
-          </a:prstGeom>
-        </p:spPr>
-      </p:pic>
-      <p:pic>
-        <p:nvPicPr>
-          <p:cNvPr id="6" name="Picture 5" descr="Chart&#10;&#10;Description automatically generated">
-            <a:extLst>
-              <a:ext uri="{FF2B5EF4-FFF2-40B4-BE49-F238E27FC236}">
-                <a16:creationId xmlns:a16="http://schemas.microsoft.com/office/drawing/2014/main" id="{0023C8D4-CAD8-D52A-4CAB-4A4A322DB7B1}"/>
-              </a:ext>
-            </a:extLst>
-          </p:cNvPr>
-          <p:cNvPicPr>
-            <a:picLocks noChangeAspect="1"/>
-          </p:cNvPicPr>
-          <p:nvPr/>
-        </p:nvPicPr>
-        <p:blipFill>
-          <a:blip r:embed="rId5">
-            <a:extLst>
-              <a:ext uri="{28A0092B-C50C-407E-A947-70E740481C1C}">
-                <a14:useLocalDpi xmlns:a14="http://schemas.microsoft.com/office/drawing/2010/main" val="0"/>
-              </a:ext>
-            </a:extLst>
-          </a:blip>
-          <a:stretch>
-            <a:fillRect/>
-          </a:stretch>
-        </p:blipFill>
-        <p:spPr>
-          <a:xfrm>
-            <a:off x="9205408" y="1963463"/>
-            <a:ext cx="2808390" cy="4444410"/>
-          </a:xfrm>
-          <a:prstGeom prst="rect">
-            <a:avLst/>
-          </a:prstGeom>
-        </p:spPr>
-      </p:pic>
-      <p:sp>
-        <p:nvSpPr>
-          <p:cNvPr id="7" name="TextBox 6">
-            <a:extLst>
-              <a:ext uri="{FF2B5EF4-FFF2-40B4-BE49-F238E27FC236}">
-                <a16:creationId xmlns:a16="http://schemas.microsoft.com/office/drawing/2014/main" id="{CFA1672B-F505-38C2-E17E-F55031B8B435}"/>
-              </a:ext>
-            </a:extLst>
-          </p:cNvPr>
-          <p:cNvSpPr txBox="1"/>
-          <p:nvPr/>
-        </p:nvSpPr>
-        <p:spPr>
-          <a:xfrm>
-            <a:off x="9330352" y="1594131"/>
-            <a:ext cx="2808390" cy="369332"/>
-          </a:xfrm>
-          <a:prstGeom prst="rect">
-            <a:avLst/>
-          </a:prstGeom>
-          <a:noFill/>
-        </p:spPr>
-        <p:txBody>
-          <a:bodyPr wrap="square">
-            <a:spAutoFit/>
-          </a:bodyPr>
-          <a:lstStyle/>
-          <a:p>
-            <a:r>
-              <a:rPr lang="en-US" sz="1800" dirty="0">
-                <a:latin typeface="Proxima Nova Lt" panose="02000506030000020004" pitchFamily="2" charset="77"/>
-              </a:rPr>
-              <a:t>Transformed/Linearized</a:t>
-            </a:r>
-            <a:endParaRPr lang="en-US" dirty="0">
-              <a:latin typeface="Proxima Nova Lt" panose="02000506030000020004" pitchFamily="2" charset="77"/>
-            </a:endParaRPr>
-          </a:p>
-        </p:txBody>
-      </p:sp>
-      <p:sp>
-        <p:nvSpPr>
-          <p:cNvPr id="8" name="Right Arrow 7">
-            <a:extLst>
-              <a:ext uri="{FF2B5EF4-FFF2-40B4-BE49-F238E27FC236}">
-                <a16:creationId xmlns:a16="http://schemas.microsoft.com/office/drawing/2014/main" id="{D33AE257-A224-C962-8062-3873C3672B7A}"/>
-              </a:ext>
-            </a:extLst>
-          </p:cNvPr>
-          <p:cNvSpPr/>
-          <p:nvPr/>
-        </p:nvSpPr>
-        <p:spPr>
-          <a:xfrm>
-            <a:off x="2712720" y="4045373"/>
-            <a:ext cx="589280" cy="212227"/>
-          </a:xfrm>
-          <a:prstGeom prst="rightArrow">
-            <a:avLst/>
-          </a:prstGeom>
-        </p:spPr>
-        <p:style>
-          <a:lnRef idx="2">
-            <a:schemeClr val="accent1">
-              <a:shade val="50000"/>
-            </a:schemeClr>
-          </a:lnRef>
-          <a:fillRef idx="1">
-            <a:schemeClr val="accent1"/>
-          </a:fillRef>
-          <a:effectRef idx="0">
-            <a:schemeClr val="accent1"/>
-          </a:effectRef>
-          <a:fontRef idx="minor">
-            <a:schemeClr val="lt1"/>
-          </a:fontRef>
-        </p:style>
-        <p:txBody>
-          <a:bodyPr rtlCol="0" anchor="ctr"/>
-          <a:lstStyle/>
-          <a:p>
-            <a:pPr algn="ctr"/>
-            <a:endParaRPr lang="en-US">
-              <a:latin typeface="Proxima Nova Lt" panose="02000506030000020004" pitchFamily="2" charset="77"/>
-            </a:endParaRPr>
-          </a:p>
-        </p:txBody>
-      </p:sp>
-      <p:sp>
-        <p:nvSpPr>
-          <p:cNvPr id="9" name="Right Arrow 8">
-            <a:extLst>
-              <a:ext uri="{FF2B5EF4-FFF2-40B4-BE49-F238E27FC236}">
-                <a16:creationId xmlns:a16="http://schemas.microsoft.com/office/drawing/2014/main" id="{2EDD7D62-46A3-AFCD-6F6C-3BC79FE5F3DD}"/>
-              </a:ext>
-            </a:extLst>
-          </p:cNvPr>
-          <p:cNvSpPr/>
-          <p:nvPr/>
-        </p:nvSpPr>
-        <p:spPr>
-          <a:xfrm>
-            <a:off x="6533809" y="4045373"/>
-            <a:ext cx="589280" cy="212227"/>
-          </a:xfrm>
-          <a:prstGeom prst="rightArrow">
-            <a:avLst/>
-          </a:prstGeom>
-        </p:spPr>
-        <p:style>
-          <a:lnRef idx="2">
-            <a:schemeClr val="accent1">
-              <a:shade val="50000"/>
-            </a:schemeClr>
-          </a:lnRef>
-          <a:fillRef idx="1">
-            <a:schemeClr val="accent1"/>
-          </a:fillRef>
-          <a:effectRef idx="0">
-            <a:schemeClr val="accent1"/>
-          </a:effectRef>
-          <a:fontRef idx="minor">
-            <a:schemeClr val="lt1"/>
-          </a:fontRef>
-        </p:style>
-        <p:txBody>
-          <a:bodyPr rtlCol="0" anchor="ctr"/>
-          <a:lstStyle/>
-          <a:p>
-            <a:pPr algn="ctr"/>
-            <a:endParaRPr lang="en-US">
-              <a:latin typeface="Proxima Nova Lt" panose="02000506030000020004" pitchFamily="2" charset="77"/>
-            </a:endParaRPr>
-          </a:p>
-        </p:txBody>
-      </p:sp>
-      <p:sp>
-        <p:nvSpPr>
-          <p:cNvPr id="10" name="Footer Placeholder 9">
-            <a:extLst>
-              <a:ext uri="{FF2B5EF4-FFF2-40B4-BE49-F238E27FC236}">
-                <a16:creationId xmlns:a16="http://schemas.microsoft.com/office/drawing/2014/main" id="{C8BEC954-E706-F412-5EA9-537F67EBE9E6}"/>
-              </a:ext>
-            </a:extLst>
-          </p:cNvPr>
-          <p:cNvSpPr>
-            <a:spLocks noGrp="1"/>
-          </p:cNvSpPr>
-          <p:nvPr>
-            <p:ph type="ftr" sz="quarter" idx="11"/>
-          </p:nvPr>
-        </p:nvSpPr>
-        <p:spPr/>
-        <p:txBody>
-          <a:bodyPr/>
-          <a:lstStyle/>
-          <a:p>
-            <a:r>
-              <a:rPr lang="en-US"/>
-              <a:t>Shared under MIT Open-Source License - Copyright 2023 Data Delve Engineer LLC</a:t>
-            </a:r>
-            <a:endParaRPr lang="en-US" dirty="0"/>
-          </a:p>
-        </p:txBody>
-      </p:sp>
-    </p:spTree>
-    <p:extLst>
-      <p:ext uri="{BB962C8B-B14F-4D97-AF65-F5344CB8AC3E}">
-        <p14:creationId xmlns:p14="http://schemas.microsoft.com/office/powerpoint/2010/main" val="1805537388"/>
       </p:ext>
     </p:extLst>
   </p:cSld>

</xml_diff>